<commit_message>
Update Borgs_Retrospective - Sprint 2.pptx
</commit_message>
<xml_diff>
--- a/docs/Borgs_Retrospective - Sprint 2.pptx
+++ b/docs/Borgs_Retrospective - Sprint 2.pptx
@@ -7656,11 +7656,33 @@
                 <a:cs typeface="Calibri"/>
                 <a:sym typeface="Calibri"/>
               </a:rPr>
-              <a:t>Little to no conflict. </a:t>
+              <a:t>1</a:t>
             </a:r>
           </a:p>
           <a:p>
-            <a:pPr marL="914400" lvl="2" indent="-285750">
+            <a:pPr marL="914400" indent="-285750">
+              <a:buClr>
+                <a:srgbClr val="B870B8"/>
+              </a:buClr>
+              <a:buSzPts val="1760"/>
+              <a:buFont typeface="Arial" panose="020B0604020202020204" pitchFamily="34" charset="0"/>
+              <a:buChar char="•"/>
+            </a:pPr>
+            <a:r>
+              <a:rPr lang="en-US" sz="1600" dirty="0">
+                <a:solidFill>
+                  <a:schemeClr val="dk1"/>
+                </a:solidFill>
+                <a:latin typeface="Calibri"/>
+                <a:ea typeface="Calibri"/>
+                <a:cs typeface="Calibri"/>
+                <a:sym typeface="Calibri"/>
+              </a:rPr>
+              <a:t>2</a:t>
+            </a:r>
+          </a:p>
+          <a:p>
+            <a:pPr marL="914400" indent="-285750">
               <a:buClr>
                 <a:srgbClr val="B870B8"/>
               </a:buClr>
@@ -7678,33 +7700,11 @@
                 <a:cs typeface="Calibri"/>
                 <a:sym typeface="Calibri"/>
               </a:rPr>
-              <a:t>Everyone was helpful to each other when answering questions. </a:t>
+              <a:t>3</a:t>
             </a:r>
           </a:p>
           <a:p>
-            <a:pPr marL="914400" lvl="2" indent="-285750">
-              <a:buClr>
-                <a:srgbClr val="B870B8"/>
-              </a:buClr>
-              <a:buSzPts val="1760"/>
-              <a:buFont typeface="Arial" panose="020B0604020202020204" pitchFamily="34" charset="0"/>
-              <a:buChar char="•"/>
-            </a:pPr>
-            <a:r>
-              <a:rPr lang="en-US" sz="1600" b="0" i="0" u="none" strike="noStrike" cap="none" dirty="0">
-                <a:solidFill>
-                  <a:schemeClr val="dk1"/>
-                </a:solidFill>
-                <a:latin typeface="Calibri"/>
-                <a:ea typeface="Calibri"/>
-                <a:cs typeface="Calibri"/>
-                <a:sym typeface="Calibri"/>
-              </a:rPr>
-              <a:t>All able to sync repositories and modify shared project.</a:t>
-            </a:r>
-          </a:p>
-          <a:p>
-            <a:pPr marL="914400" lvl="2" indent="-285750">
+            <a:pPr marL="914400" indent="-285750">
               <a:buClr>
                 <a:srgbClr val="B870B8"/>
               </a:buClr>
@@ -7718,12 +7718,13 @@
                   <a:schemeClr val="dk1"/>
                 </a:solidFill>
                 <a:latin typeface="Calibri"/>
+                <a:ea typeface="Calibri"/>
                 <a:cs typeface="Calibri"/>
                 <a:sym typeface="Calibri"/>
               </a:rPr>
-              <a:t>Met up to discuss any major conflicts or issues.</a:t>
+              <a:t>4</a:t>
             </a:r>
-            <a:endParaRPr dirty="0"/>
+            <a:endParaRPr lang="en-US" dirty="0"/>
           </a:p>
           <a:p>
             <a:pPr marL="968375" lvl="2" indent="-282575">
@@ -7758,34 +7759,14 @@
                 <a:cs typeface="Calibri"/>
                 <a:sym typeface="Calibri"/>
               </a:rPr>
-              <a:t>r – </a:t>
+              <a:t>r –</a:t>
             </a:r>
-            <a:r>
-              <a:rPr lang="en-US" sz="1600" dirty="0">
-                <a:solidFill>
-                  <a:schemeClr val="dk1"/>
-                </a:solidFill>
-                <a:latin typeface="Calibri"/>
-                <a:cs typeface="Calibri"/>
-              </a:rPr>
-              <a:t>Idea input creation and providing resources to team.</a:t>
-            </a:r>
-            <a:endParaRPr sz="1600" dirty="0">
-              <a:solidFill>
-                <a:schemeClr val="dk1"/>
-              </a:solidFill>
-              <a:latin typeface="Calibri"/>
-              <a:cs typeface="Calibri"/>
-            </a:endParaRPr>
           </a:p>
           <a:p>
-            <a:pPr marL="968375" marR="0" lvl="2" indent="-282575" algn="l" rtl="0">
+            <a:pPr marL="968375" lvl="2" indent="-282575">
               <a:spcBef>
                 <a:spcPts val="1200"/>
               </a:spcBef>
-              <a:spcAft>
-                <a:spcPts val="0"/>
-              </a:spcAft>
               <a:buClr>
                 <a:srgbClr val="B870B8"/>
               </a:buClr>
@@ -7805,28 +7786,12 @@
               </a:rPr>
               <a:t> Carter –</a:t>
             </a:r>
-            <a:r>
-              <a:rPr lang="en-US" sz="1600" dirty="0">
-                <a:solidFill>
-                  <a:schemeClr val="dk1"/>
-                </a:solidFill>
-                <a:latin typeface="Calibri"/>
-                <a:ea typeface="Calibri"/>
-                <a:cs typeface="Calibri"/>
-                <a:sym typeface="Calibri"/>
-              </a:rPr>
-              <a:t> No conflict while working on project. Everyone worked well as a team and all discussions went smoothly, work was evenly distributed. </a:t>
-            </a:r>
-            <a:endParaRPr dirty="0"/>
           </a:p>
           <a:p>
-            <a:pPr marL="968375" marR="0" lvl="2" indent="-282575" algn="l" rtl="0">
+            <a:pPr marL="968375" lvl="2" indent="-282575">
               <a:spcBef>
                 <a:spcPts val="1200"/>
               </a:spcBef>
-              <a:spcAft>
-                <a:spcPts val="0"/>
-              </a:spcAft>
               <a:buClr>
                 <a:srgbClr val="B870B8"/>
               </a:buClr>
@@ -7844,18 +7809,14 @@
                 <a:cs typeface="Calibri"/>
                 <a:sym typeface="Calibri"/>
               </a:rPr>
-              <a:t> Daniel – Repository organization.</a:t>
+              <a:t>Daniel –</a:t>
             </a:r>
-            <a:endParaRPr dirty="0"/>
           </a:p>
           <a:p>
-            <a:pPr marL="968375" marR="0" lvl="2" indent="-282575" algn="l" rtl="0">
+            <a:pPr marL="968375" lvl="2" indent="-282575">
               <a:spcBef>
                 <a:spcPts val="1200"/>
               </a:spcBef>
-              <a:spcAft>
-                <a:spcPts val="0"/>
-              </a:spcAft>
               <a:buClr>
                 <a:srgbClr val="B870B8"/>
               </a:buClr>
@@ -7902,33 +7863,8 @@
                 <a:cs typeface="Calibri"/>
                 <a:sym typeface="Calibri"/>
               </a:rPr>
-              <a:t> Luke – Cooperation, agreement, etc.</a:t>
+              <a:t> Luke – </a:t>
             </a:r>
-            <a:endParaRPr sz="1800" b="0" i="0" u="none" strike="noStrike" cap="none" dirty="0">
-              <a:solidFill>
-                <a:srgbClr val="595959"/>
-              </a:solidFill>
-              <a:latin typeface="Calibri"/>
-              <a:ea typeface="Calibri"/>
-              <a:cs typeface="Calibri"/>
-              <a:sym typeface="Calibri"/>
-            </a:endParaRPr>
-          </a:p>
-          <a:p>
-            <a:pPr marL="685800" marR="0" lvl="1" indent="-224790" algn="l" rtl="0">
-              <a:spcBef>
-                <a:spcPts val="1200"/>
-              </a:spcBef>
-              <a:spcAft>
-                <a:spcPts val="0"/>
-              </a:spcAft>
-              <a:buClr>
-                <a:srgbClr val="4D264D"/>
-              </a:buClr>
-              <a:buSzPts val="1760"/>
-              <a:buFont typeface="Noto Sans Symbols"/>
-              <a:buNone/>
-            </a:pPr>
             <a:endParaRPr sz="1600" b="0" i="0" u="none" strike="noStrike" cap="none" dirty="0">
               <a:solidFill>
                 <a:srgbClr val="595959"/>
@@ -8591,19 +8527,14 @@
                   <a:schemeClr val="dk1"/>
                 </a:solidFill>
               </a:rPr>
-              <a:t>Time management, underestimating how much time it takes to complete a task</a:t>
+              <a:t>1</a:t>
             </a:r>
           </a:p>
           <a:p>
-            <a:pPr marL="968375" lvl="2" indent="-282575" algn="l" rtl="0">
+            <a:pPr marL="968375" lvl="2" indent="-282575">
               <a:spcBef>
                 <a:spcPts val="1200"/>
               </a:spcBef>
-              <a:spcAft>
-                <a:spcPts val="0"/>
-              </a:spcAft>
-              <a:buSzPts val="1980"/>
-              <a:buChar char="⚫"/>
             </a:pPr>
             <a:r>
               <a:rPr lang="en-US" sz="1800" dirty="0">
@@ -8611,20 +8542,14 @@
                   <a:schemeClr val="dk1"/>
                 </a:solidFill>
               </a:rPr>
-              <a:t> Learning new tools/languages/frameworks so that everyone has an equal understanding of the project.</a:t>
+              <a:t>2</a:t>
             </a:r>
-            <a:endParaRPr dirty="0"/>
           </a:p>
           <a:p>
-            <a:pPr marL="968375" lvl="2" indent="-282575" algn="l" rtl="0">
+            <a:pPr marL="968375" lvl="2" indent="-282575">
               <a:spcBef>
                 <a:spcPts val="1200"/>
               </a:spcBef>
-              <a:spcAft>
-                <a:spcPts val="0"/>
-              </a:spcAft>
-              <a:buSzPts val="1980"/>
-              <a:buChar char="⚫"/>
             </a:pPr>
             <a:r>
               <a:rPr lang="en-US" sz="1800" dirty="0">
@@ -8632,7 +8557,7 @@
                   <a:schemeClr val="dk1"/>
                 </a:solidFill>
               </a:rPr>
-              <a:t> Learning how to create “real time” updates for the multiplayer aspect with multiple users. Will require more research. </a:t>
+              <a:t>3</a:t>
             </a:r>
             <a:endParaRPr dirty="0"/>
           </a:p>
@@ -9327,36 +9252,6 @@
               </a:rPr>
               <a:t>TEAM – </a:t>
             </a:r>
-            <a:r>
-              <a:rPr lang="en-US" sz="1400" dirty="0">
-                <a:solidFill>
-                  <a:schemeClr val="dk1"/>
-                </a:solidFill>
-              </a:rPr>
-              <a:t>Updating Task Board and Communication. Having more realistic tasks that can be completed within the time frame.</a:t>
-            </a:r>
-            <a:endParaRPr dirty="0"/>
-          </a:p>
-          <a:p>
-            <a:pPr marL="968375" lvl="2" indent="-282575">
-              <a:spcBef>
-                <a:spcPts val="1200"/>
-              </a:spcBef>
-              <a:buSzPts val="1760"/>
-            </a:pPr>
-            <a:r>
-              <a:rPr lang="en-US" sz="1600" dirty="0">
-                <a:solidFill>
-                  <a:schemeClr val="dk1"/>
-                </a:solidFill>
-              </a:rPr>
-              <a:t>Walter – Communication relay. Better response time on tasks. </a:t>
-            </a:r>
-            <a:endParaRPr sz="1600" dirty="0">
-              <a:solidFill>
-                <a:schemeClr val="dk1"/>
-              </a:solidFill>
-            </a:endParaRPr>
           </a:p>
           <a:p>
             <a:pPr marL="968375" lvl="2" indent="-282575" algn="l" rtl="0">
@@ -9375,9 +9270,24 @@
                   <a:schemeClr val="dk1"/>
                 </a:solidFill>
               </a:rPr>
-              <a:t>Carter – Time management, starting tasks a lot earlier so we don’t do things last second. </a:t>
+              <a:t>Walter –</a:t>
             </a:r>
-            <a:endParaRPr dirty="0"/>
+          </a:p>
+          <a:p>
+            <a:pPr marL="968375" lvl="2" indent="-282575">
+              <a:spcBef>
+                <a:spcPts val="1200"/>
+              </a:spcBef>
+              <a:buSzPts val="1760"/>
+            </a:pPr>
+            <a:r>
+              <a:rPr lang="en-US" sz="1600" dirty="0">
+                <a:solidFill>
+                  <a:schemeClr val="dk1"/>
+                </a:solidFill>
+              </a:rPr>
+              <a:t>Carter –</a:t>
+            </a:r>
           </a:p>
           <a:p>
             <a:pPr marL="968375" lvl="2" indent="-282575" algn="l" rtl="0">
@@ -9396,9 +9306,8 @@
                   <a:schemeClr val="dk1"/>
                 </a:solidFill>
               </a:rPr>
-              <a:t>Daniel – Informing team of current task and task progress. Manage personal schedule to have more time for group meetups.</a:t>
+              <a:t>Daniel – Better time management and communicating availability.</a:t>
             </a:r>
-            <a:endParaRPr dirty="0"/>
           </a:p>
           <a:p>
             <a:pPr marL="968375" lvl="2" indent="-282575" algn="l" rtl="0">
@@ -9438,21 +9347,8 @@
                   <a:schemeClr val="dk1"/>
                 </a:solidFill>
               </a:rPr>
-              <a:t>Luke – Communication, ask for help when necessary</a:t>
+              <a:t>Luke – </a:t>
             </a:r>
-            <a:endParaRPr sz="1800" dirty="0"/>
-          </a:p>
-          <a:p>
-            <a:pPr marL="685800" lvl="1" indent="-224790" algn="l" rtl="0">
-              <a:spcBef>
-                <a:spcPts val="1200"/>
-              </a:spcBef>
-              <a:spcAft>
-                <a:spcPts val="0"/>
-              </a:spcAft>
-              <a:buSzPts val="1760"/>
-              <a:buNone/>
-            </a:pPr>
             <a:endParaRPr sz="1600" dirty="0"/>
           </a:p>
           <a:p>

</xml_diff>